<commit_message>
Cahier des charges final 100
</commit_message>
<xml_diff>
--- a/files/power.pptx
+++ b/files/power.pptx
@@ -206,7 +206,7 @@
           <a:p>
             <a:fld id="{3A4C0F34-9A73-47B9-8464-79D0A459A40D}" type="datetimeFigureOut">
               <a:rPr lang="fr-FR" smtClean="0"/>
-              <a:t>05/04/2022</a:t>
+              <a:t>06/04/2022</a:t>
             </a:fld>
             <a:endParaRPr lang="fr-FR"/>
           </a:p>
@@ -620,7 +620,7 @@
           <a:p>
             <a:fld id="{656DC873-8F15-4EF4-8C02-478A12A83CDE}" type="datetime1">
               <a:rPr lang="en-US" smtClean="0"/>
-              <a:t>4/5/2022</a:t>
+              <a:t>4/6/2022</a:t>
             </a:fld>
             <a:endParaRPr lang="en-US"/>
           </a:p>
@@ -818,7 +818,7 @@
           <a:p>
             <a:fld id="{C886A686-1088-477A-9300-BDF20A2545B2}" type="datetime1">
               <a:rPr lang="en-US" smtClean="0"/>
-              <a:t>4/5/2022</a:t>
+              <a:t>4/6/2022</a:t>
             </a:fld>
             <a:endParaRPr lang="en-US"/>
           </a:p>
@@ -1026,7 +1026,7 @@
           <a:p>
             <a:fld id="{3082F7CA-6027-4867-B48C-E9CD3AC81D83}" type="datetime1">
               <a:rPr lang="en-US" smtClean="0"/>
-              <a:t>4/5/2022</a:t>
+              <a:t>4/6/2022</a:t>
             </a:fld>
             <a:endParaRPr lang="en-US"/>
           </a:p>
@@ -1225,7 +1225,7 @@
           <a:p>
             <a:fld id="{E1E62559-768D-4AFB-8687-91A9A94F62E2}" type="datetime1">
               <a:rPr lang="en-US" smtClean="0"/>
-              <a:t>4/5/2022</a:t>
+              <a:t>4/6/2022</a:t>
             </a:fld>
             <a:endParaRPr lang="en-US"/>
           </a:p>
@@ -1500,7 +1500,7 @@
           <a:p>
             <a:fld id="{53B0AFC3-32C4-4D26-8AF0-A143C9A71E95}" type="datetime1">
               <a:rPr lang="en-US" smtClean="0"/>
-              <a:t>4/5/2022</a:t>
+              <a:t>4/6/2022</a:t>
             </a:fld>
             <a:endParaRPr lang="en-US"/>
           </a:p>
@@ -1765,7 +1765,7 @@
           <a:p>
             <a:fld id="{F0DC9144-86CA-4443-916C-DC50A6D42EAC}" type="datetime1">
               <a:rPr lang="en-US" smtClean="0"/>
-              <a:t>4/5/2022</a:t>
+              <a:t>4/6/2022</a:t>
             </a:fld>
             <a:endParaRPr lang="en-US"/>
           </a:p>
@@ -2177,7 +2177,7 @@
           <a:p>
             <a:fld id="{2EE13D0E-AB58-4EA3-9751-C0945B9AD4CD}" type="datetime1">
               <a:rPr lang="en-US" smtClean="0"/>
-              <a:t>4/5/2022</a:t>
+              <a:t>4/6/2022</a:t>
             </a:fld>
             <a:endParaRPr lang="en-US"/>
           </a:p>
@@ -2318,7 +2318,7 @@
           <a:p>
             <a:fld id="{22C9529E-D24E-4147-80D8-ACB30A00A89B}" type="datetime1">
               <a:rPr lang="en-US" smtClean="0"/>
-              <a:t>4/5/2022</a:t>
+              <a:t>4/6/2022</a:t>
             </a:fld>
             <a:endParaRPr lang="en-US"/>
           </a:p>
@@ -2431,7 +2431,7 @@
           <a:p>
             <a:fld id="{F433172A-7A6B-47EF-9BB7-49730EE9A39E}" type="datetime1">
               <a:rPr lang="en-US" smtClean="0"/>
-              <a:t>4/5/2022</a:t>
+              <a:t>4/6/2022</a:t>
             </a:fld>
             <a:endParaRPr lang="en-US"/>
           </a:p>
@@ -2743,7 +2743,7 @@
           <a:p>
             <a:fld id="{645C27E4-8C5C-43D5-A548-FCC1347DD435}" type="datetime1">
               <a:rPr lang="en-US" smtClean="0"/>
-              <a:t>4/5/2022</a:t>
+              <a:t>4/6/2022</a:t>
             </a:fld>
             <a:endParaRPr lang="en-US"/>
           </a:p>
@@ -3034,7 +3034,7 @@
           <a:p>
             <a:fld id="{03C595CB-0797-45D2-8D17-A1561F4F7FAB}" type="datetime1">
               <a:rPr lang="en-US" smtClean="0"/>
-              <a:t>4/5/2022</a:t>
+              <a:t>4/6/2022</a:t>
             </a:fld>
             <a:endParaRPr lang="en-US"/>
           </a:p>
@@ -3789,7 +3789,7 @@
           <a:p>
             <a:fld id="{C5312436-95C8-4F55-9489-09CAFDB83AE6}" type="datetime1">
               <a:rPr lang="en-US" smtClean="0"/>
-              <a:t>4/5/2022</a:t>
+              <a:t>4/6/2022</a:t>
             </a:fld>
             <a:endParaRPr lang="en-US"/>
           </a:p>
@@ -7008,42 +7008,6 @@
           </a:prstGeom>
         </p:spPr>
       </p:pic>
-      <p:pic>
-        <p:nvPicPr>
-          <p:cNvPr id="8" name="Image 7" descr="Une image contenant texte, tasse, café, vaisseau&#10;&#10;Description générée automatiquement">
-            <a:extLst>
-              <a:ext uri="{FF2B5EF4-FFF2-40B4-BE49-F238E27FC236}">
-                <a16:creationId xmlns:a16="http://schemas.microsoft.com/office/drawing/2014/main" id="{17DC5EF4-B0A0-4B24-B92D-6CF95D297E12}"/>
-              </a:ext>
-            </a:extLst>
-          </p:cNvPr>
-          <p:cNvPicPr>
-            <a:picLocks noChangeAspect="1"/>
-          </p:cNvPicPr>
-          <p:nvPr/>
-        </p:nvPicPr>
-        <p:blipFill>
-          <a:blip r:embed="rId5">
-            <a:extLst>
-              <a:ext uri="{28A0092B-C50C-407E-A947-70E740481C1C}">
-                <a14:useLocalDpi xmlns:a14="http://schemas.microsoft.com/office/drawing/2010/main" val="0"/>
-              </a:ext>
-            </a:extLst>
-          </a:blip>
-          <a:stretch>
-            <a:fillRect/>
-          </a:stretch>
-        </p:blipFill>
-        <p:spPr>
-          <a:xfrm>
-            <a:off x="9252518" y="2847665"/>
-            <a:ext cx="2578510" cy="2578510"/>
-          </a:xfrm>
-          <a:prstGeom prst="rect">
-            <a:avLst/>
-          </a:prstGeom>
-        </p:spPr>
-      </p:pic>
       <p:cxnSp>
         <p:nvCxnSpPr>
           <p:cNvPr id="9" name="Connecteur droit avec flèche 8">
@@ -7168,7 +7132,7 @@
                   <a:srgbClr val="FF0000"/>
                 </a:solidFill>
               </a:rPr>
-              <a:t>https</a:t>
+              <a:t>TCP/IP</a:t>
             </a:r>
           </a:p>
         </p:txBody>
@@ -7207,7 +7171,7 @@
                   <a:srgbClr val="FF0000"/>
                 </a:solidFill>
               </a:rPr>
-              <a:t>https</a:t>
+              <a:t>HTTPS</a:t>
             </a:r>
           </a:p>
         </p:txBody>
@@ -7248,6 +7212,47 @@
           </a:p>
         </p:txBody>
       </p:sp>
+      <p:pic>
+        <p:nvPicPr>
+          <p:cNvPr id="16" name="Image 15" descr="SQLite - Wikipedia">
+            <a:extLst>
+              <a:ext uri="{FF2B5EF4-FFF2-40B4-BE49-F238E27FC236}">
+                <a16:creationId xmlns:a16="http://schemas.microsoft.com/office/drawing/2014/main" id="{4BD1F94C-9594-4194-B821-1627573F85B2}"/>
+              </a:ext>
+            </a:extLst>
+          </p:cNvPr>
+          <p:cNvPicPr>
+            <a:picLocks noChangeAspect="1"/>
+          </p:cNvPicPr>
+          <p:nvPr/>
+        </p:nvPicPr>
+        <p:blipFill>
+          <a:blip r:embed="rId5">
+            <a:extLst>
+              <a:ext uri="{28A0092B-C50C-407E-A947-70E740481C1C}">
+                <a14:useLocalDpi xmlns:a14="http://schemas.microsoft.com/office/drawing/2010/main" val="0"/>
+              </a:ext>
+            </a:extLst>
+          </a:blip>
+          <a:srcRect/>
+          <a:stretch>
+            <a:fillRect/>
+          </a:stretch>
+        </p:blipFill>
+        <p:spPr bwMode="auto">
+          <a:xfrm>
+            <a:off x="9512334" y="3565418"/>
+            <a:ext cx="2410148" cy="1143001"/>
+          </a:xfrm>
+          <a:prstGeom prst="rect">
+            <a:avLst/>
+          </a:prstGeom>
+          <a:noFill/>
+          <a:ln>
+            <a:noFill/>
+          </a:ln>
+        </p:spPr>
+      </p:pic>
     </p:spTree>
     <p:extLst>
       <p:ext uri="{BB962C8B-B14F-4D97-AF65-F5344CB8AC3E}">

</xml_diff>

<commit_message>
Adding style for the app globaly
</commit_message>
<xml_diff>
--- a/files/power.pptx
+++ b/files/power.pptx
@@ -5,7 +5,7 @@
     <p:sldMasterId id="2147483699" r:id="rId1"/>
   </p:sldMasterIdLst>
   <p:notesMasterIdLst>
-    <p:notesMasterId r:id="rId12"/>
+    <p:notesMasterId r:id="rId13"/>
   </p:notesMasterIdLst>
   <p:sldIdLst>
     <p:sldId id="256" r:id="rId2"/>
@@ -14,10 +14,11 @@
     <p:sldId id="260" r:id="rId5"/>
     <p:sldId id="267" r:id="rId6"/>
     <p:sldId id="266" r:id="rId7"/>
-    <p:sldId id="262" r:id="rId8"/>
-    <p:sldId id="263" r:id="rId9"/>
-    <p:sldId id="264" r:id="rId10"/>
-    <p:sldId id="265" r:id="rId11"/>
+    <p:sldId id="268" r:id="rId8"/>
+    <p:sldId id="262" r:id="rId9"/>
+    <p:sldId id="263" r:id="rId10"/>
+    <p:sldId id="264" r:id="rId11"/>
+    <p:sldId id="265" r:id="rId12"/>
   </p:sldIdLst>
   <p:sldSz cx="12192000" cy="6858000"/>
   <p:notesSz cx="6858000" cy="9144000"/>
@@ -206,7 +207,7 @@
           <a:p>
             <a:fld id="{3A4C0F34-9A73-47B9-8464-79D0A459A40D}" type="datetimeFigureOut">
               <a:rPr lang="fr-FR" smtClean="0"/>
-              <a:t>06/04/2022</a:t>
+              <a:t>03/05/2022</a:t>
             </a:fld>
             <a:endParaRPr lang="fr-FR"/>
           </a:p>
@@ -620,7 +621,7 @@
           <a:p>
             <a:fld id="{656DC873-8F15-4EF4-8C02-478A12A83CDE}" type="datetime1">
               <a:rPr lang="en-US" smtClean="0"/>
-              <a:t>4/6/2022</a:t>
+              <a:t>5/3/2022</a:t>
             </a:fld>
             <a:endParaRPr lang="en-US"/>
           </a:p>
@@ -818,7 +819,7 @@
           <a:p>
             <a:fld id="{C886A686-1088-477A-9300-BDF20A2545B2}" type="datetime1">
               <a:rPr lang="en-US" smtClean="0"/>
-              <a:t>4/6/2022</a:t>
+              <a:t>5/3/2022</a:t>
             </a:fld>
             <a:endParaRPr lang="en-US"/>
           </a:p>
@@ -1026,7 +1027,7 @@
           <a:p>
             <a:fld id="{3082F7CA-6027-4867-B48C-E9CD3AC81D83}" type="datetime1">
               <a:rPr lang="en-US" smtClean="0"/>
-              <a:t>4/6/2022</a:t>
+              <a:t>5/3/2022</a:t>
             </a:fld>
             <a:endParaRPr lang="en-US"/>
           </a:p>
@@ -1225,7 +1226,7 @@
           <a:p>
             <a:fld id="{E1E62559-768D-4AFB-8687-91A9A94F62E2}" type="datetime1">
               <a:rPr lang="en-US" smtClean="0"/>
-              <a:t>4/6/2022</a:t>
+              <a:t>5/3/2022</a:t>
             </a:fld>
             <a:endParaRPr lang="en-US"/>
           </a:p>
@@ -1500,7 +1501,7 @@
           <a:p>
             <a:fld id="{53B0AFC3-32C4-4D26-8AF0-A143C9A71E95}" type="datetime1">
               <a:rPr lang="en-US" smtClean="0"/>
-              <a:t>4/6/2022</a:t>
+              <a:t>5/3/2022</a:t>
             </a:fld>
             <a:endParaRPr lang="en-US"/>
           </a:p>
@@ -1765,7 +1766,7 @@
           <a:p>
             <a:fld id="{F0DC9144-86CA-4443-916C-DC50A6D42EAC}" type="datetime1">
               <a:rPr lang="en-US" smtClean="0"/>
-              <a:t>4/6/2022</a:t>
+              <a:t>5/3/2022</a:t>
             </a:fld>
             <a:endParaRPr lang="en-US"/>
           </a:p>
@@ -2177,7 +2178,7 @@
           <a:p>
             <a:fld id="{2EE13D0E-AB58-4EA3-9751-C0945B9AD4CD}" type="datetime1">
               <a:rPr lang="en-US" smtClean="0"/>
-              <a:t>4/6/2022</a:t>
+              <a:t>5/3/2022</a:t>
             </a:fld>
             <a:endParaRPr lang="en-US"/>
           </a:p>
@@ -2318,7 +2319,7 @@
           <a:p>
             <a:fld id="{22C9529E-D24E-4147-80D8-ACB30A00A89B}" type="datetime1">
               <a:rPr lang="en-US" smtClean="0"/>
-              <a:t>4/6/2022</a:t>
+              <a:t>5/3/2022</a:t>
             </a:fld>
             <a:endParaRPr lang="en-US"/>
           </a:p>
@@ -2431,7 +2432,7 @@
           <a:p>
             <a:fld id="{F433172A-7A6B-47EF-9BB7-49730EE9A39E}" type="datetime1">
               <a:rPr lang="en-US" smtClean="0"/>
-              <a:t>4/6/2022</a:t>
+              <a:t>5/3/2022</a:t>
             </a:fld>
             <a:endParaRPr lang="en-US"/>
           </a:p>
@@ -2743,7 +2744,7 @@
           <a:p>
             <a:fld id="{645C27E4-8C5C-43D5-A548-FCC1347DD435}" type="datetime1">
               <a:rPr lang="en-US" smtClean="0"/>
-              <a:t>4/6/2022</a:t>
+              <a:t>5/3/2022</a:t>
             </a:fld>
             <a:endParaRPr lang="en-US"/>
           </a:p>
@@ -3034,7 +3035,7 @@
           <a:p>
             <a:fld id="{03C595CB-0797-45D2-8D17-A1561F4F7FAB}" type="datetime1">
               <a:rPr lang="en-US" smtClean="0"/>
-              <a:t>4/6/2022</a:t>
+              <a:t>5/3/2022</a:t>
             </a:fld>
             <a:endParaRPr lang="en-US"/>
           </a:p>
@@ -3789,7 +3790,7 @@
           <a:p>
             <a:fld id="{C5312436-95C8-4F55-9489-09CAFDB83AE6}" type="datetime1">
               <a:rPr lang="en-US" smtClean="0"/>
-              <a:t>4/6/2022</a:t>
+              <a:t>5/3/2022</a:t>
             </a:fld>
             <a:endParaRPr lang="en-US"/>
           </a:p>
@@ -4744,12 +4745,73 @@
           <a:chExt cx="0" cy="0"/>
         </a:xfrm>
       </p:grpSpPr>
+      <p:sp>
+        <p:nvSpPr>
+          <p:cNvPr id="2" name="Titre 1">
+            <a:extLst>
+              <a:ext uri="{FF2B5EF4-FFF2-40B4-BE49-F238E27FC236}">
+                <a16:creationId xmlns:a16="http://schemas.microsoft.com/office/drawing/2014/main" id="{9015EA5D-F7D8-4592-9528-661EA62F3201}"/>
+              </a:ext>
+            </a:extLst>
+          </p:cNvPr>
+          <p:cNvSpPr>
+            <a:spLocks noGrp="1"/>
+          </p:cNvSpPr>
+          <p:nvPr>
+            <p:ph type="title"/>
+          </p:nvPr>
+        </p:nvSpPr>
+        <p:spPr/>
+        <p:txBody>
+          <a:bodyPr/>
+          <a:lstStyle/>
+          <a:p>
+            <a:r>
+              <a:rPr lang="fr-FR" dirty="0"/>
+              <a:t>Difficultés rencontrés</a:t>
+            </a:r>
+          </a:p>
+        </p:txBody>
+      </p:sp>
+      <p:sp>
+        <p:nvSpPr>
+          <p:cNvPr id="3" name="Espace réservé du contenu 2">
+            <a:extLst>
+              <a:ext uri="{FF2B5EF4-FFF2-40B4-BE49-F238E27FC236}">
+                <a16:creationId xmlns:a16="http://schemas.microsoft.com/office/drawing/2014/main" id="{3604A20E-7854-44D4-B4C0-1565346C2673}"/>
+              </a:ext>
+            </a:extLst>
+          </p:cNvPr>
+          <p:cNvSpPr>
+            <a:spLocks noGrp="1"/>
+          </p:cNvSpPr>
+          <p:nvPr>
+            <p:ph idx="1"/>
+          </p:nvPr>
+        </p:nvSpPr>
+        <p:spPr/>
+        <p:txBody>
+          <a:bodyPr/>
+          <a:lstStyle/>
+          <a:p>
+            <a:r>
+              <a:rPr lang="fr-FR" dirty="0"/>
+              <a:t>List </a:t>
+            </a:r>
+            <a:r>
+              <a:rPr lang="fr-FR" dirty="0" err="1"/>
+              <a:t>Refreshing</a:t>
+            </a:r>
+            <a:endParaRPr lang="fr-FR" dirty="0"/>
+          </a:p>
+        </p:txBody>
+      </p:sp>
       <p:pic>
         <p:nvPicPr>
-          <p:cNvPr id="5" name="Image 4">
-            <a:extLst>
-              <a:ext uri="{FF2B5EF4-FFF2-40B4-BE49-F238E27FC236}">
-                <a16:creationId xmlns:a16="http://schemas.microsoft.com/office/drawing/2014/main" id="{B32C1E61-3FD1-4985-BCB3-B45D71A97E60}"/>
+          <p:cNvPr id="4" name="Image 3">
+            <a:extLst>
+              <a:ext uri="{FF2B5EF4-FFF2-40B4-BE49-F238E27FC236}">
+                <a16:creationId xmlns:a16="http://schemas.microsoft.com/office/drawing/2014/main" id="{4F8A4A1E-10D1-4885-90FF-0EB2C6FF9618}"/>
               </a:ext>
             </a:extLst>
           </p:cNvPr>
@@ -4775,10 +4837,10 @@
       </p:pic>
       <p:sp>
         <p:nvSpPr>
-          <p:cNvPr id="7" name="Espace réservé du numéro de diapositive 6">
-            <a:extLst>
-              <a:ext uri="{FF2B5EF4-FFF2-40B4-BE49-F238E27FC236}">
-                <a16:creationId xmlns:a16="http://schemas.microsoft.com/office/drawing/2014/main" id="{CCB9FB4B-73F7-440E-B6D5-5BDEA257F810}"/>
+          <p:cNvPr id="5" name="Espace réservé du numéro de diapositive 4">
+            <a:extLst>
+              <a:ext uri="{FF2B5EF4-FFF2-40B4-BE49-F238E27FC236}">
+                <a16:creationId xmlns:a16="http://schemas.microsoft.com/office/drawing/2014/main" id="{961771C7-9CE0-477F-9677-5AB8A5CD8191}"/>
               </a:ext>
             </a:extLst>
           </p:cNvPr>
@@ -4797,6 +4859,94 @@
             <a:fld id="{07CE569E-9B7C-4CB9-AB80-C0841F922CFF}" type="slidenum">
               <a:rPr lang="en-US" smtClean="0"/>
               <a:t>10</a:t>
+            </a:fld>
+            <a:endParaRPr lang="en-US"/>
+          </a:p>
+        </p:txBody>
+      </p:sp>
+    </p:spTree>
+    <p:extLst>
+      <p:ext uri="{BB962C8B-B14F-4D97-AF65-F5344CB8AC3E}">
+        <p14:creationId xmlns:p14="http://schemas.microsoft.com/office/powerpoint/2010/main" val="1646511795"/>
+      </p:ext>
+    </p:extLst>
+  </p:cSld>
+  <p:clrMapOvr>
+    <a:masterClrMapping/>
+  </p:clrMapOvr>
+</p:sld>
+</file>
+
+<file path=ppt/slides/slide11.xml><?xml version="1.0" encoding="utf-8"?>
+<p:sld xmlns:a="http://schemas.openxmlformats.org/drawingml/2006/main" xmlns:r="http://schemas.openxmlformats.org/officeDocument/2006/relationships" xmlns:p="http://schemas.openxmlformats.org/presentationml/2006/main">
+  <p:cSld>
+    <p:spTree>
+      <p:nvGrpSpPr>
+        <p:cNvPr id="1" name=""/>
+        <p:cNvGrpSpPr/>
+        <p:nvPr/>
+      </p:nvGrpSpPr>
+      <p:grpSpPr>
+        <a:xfrm>
+          <a:off x="0" y="0"/>
+          <a:ext cx="0" cy="0"/>
+          <a:chOff x="0" y="0"/>
+          <a:chExt cx="0" cy="0"/>
+        </a:xfrm>
+      </p:grpSpPr>
+      <p:pic>
+        <p:nvPicPr>
+          <p:cNvPr id="5" name="Image 4">
+            <a:extLst>
+              <a:ext uri="{FF2B5EF4-FFF2-40B4-BE49-F238E27FC236}">
+                <a16:creationId xmlns:a16="http://schemas.microsoft.com/office/drawing/2014/main" id="{B32C1E61-3FD1-4985-BCB3-B45D71A97E60}"/>
+              </a:ext>
+            </a:extLst>
+          </p:cNvPr>
+          <p:cNvPicPr/>
+          <p:nvPr/>
+        </p:nvPicPr>
+        <p:blipFill>
+          <a:blip r:embed="rId2"/>
+          <a:stretch/>
+        </p:blipFill>
+        <p:spPr>
+          <a:xfrm>
+            <a:off x="10717408" y="-1"/>
+            <a:ext cx="1620000" cy="1620000"/>
+          </a:xfrm>
+          <a:prstGeom prst="rect">
+            <a:avLst/>
+          </a:prstGeom>
+          <a:ln w="0">
+            <a:noFill/>
+          </a:ln>
+        </p:spPr>
+      </p:pic>
+      <p:sp>
+        <p:nvSpPr>
+          <p:cNvPr id="7" name="Espace réservé du numéro de diapositive 6">
+            <a:extLst>
+              <a:ext uri="{FF2B5EF4-FFF2-40B4-BE49-F238E27FC236}">
+                <a16:creationId xmlns:a16="http://schemas.microsoft.com/office/drawing/2014/main" id="{CCB9FB4B-73F7-440E-B6D5-5BDEA257F810}"/>
+              </a:ext>
+            </a:extLst>
+          </p:cNvPr>
+          <p:cNvSpPr>
+            <a:spLocks noGrp="1"/>
+          </p:cNvSpPr>
+          <p:nvPr>
+            <p:ph type="sldNum" sz="quarter" idx="12"/>
+          </p:nvPr>
+        </p:nvSpPr>
+        <p:spPr/>
+        <p:txBody>
+          <a:bodyPr/>
+          <a:lstStyle/>
+          <a:p>
+            <a:fld id="{07CE569E-9B7C-4CB9-AB80-C0841F922CFF}" type="slidenum">
+              <a:rPr lang="en-US" smtClean="0"/>
+              <a:t>11</a:t>
             </a:fld>
             <a:endParaRPr lang="en-US"/>
           </a:p>
@@ -6724,6 +6874,150 @@
           </a:p>
         </p:txBody>
       </p:sp>
+      <p:pic>
+        <p:nvPicPr>
+          <p:cNvPr id="6" name="Image 5">
+            <a:extLst>
+              <a:ext uri="{FF2B5EF4-FFF2-40B4-BE49-F238E27FC236}">
+                <a16:creationId xmlns:a16="http://schemas.microsoft.com/office/drawing/2014/main" id="{9AFE43AA-8B8B-16F7-5115-EA520F2A8E56}"/>
+              </a:ext>
+            </a:extLst>
+          </p:cNvPr>
+          <p:cNvPicPr>
+            <a:picLocks noChangeAspect="1"/>
+          </p:cNvPicPr>
+          <p:nvPr/>
+        </p:nvPicPr>
+        <p:blipFill>
+          <a:blip r:embed="rId3">
+            <a:extLst>
+              <a:ext uri="{28A0092B-C50C-407E-A947-70E740481C1C}">
+                <a14:useLocalDpi xmlns:a14="http://schemas.microsoft.com/office/drawing/2010/main" val="0"/>
+              </a:ext>
+            </a:extLst>
+          </a:blip>
+          <a:stretch>
+            <a:fillRect/>
+          </a:stretch>
+        </p:blipFill>
+        <p:spPr>
+          <a:xfrm>
+            <a:off x="202097" y="2410410"/>
+            <a:ext cx="2298590" cy="2298590"/>
+          </a:xfrm>
+          <a:prstGeom prst="rect">
+            <a:avLst/>
+          </a:prstGeom>
+        </p:spPr>
+      </p:pic>
+      <p:pic>
+        <p:nvPicPr>
+          <p:cNvPr id="8" name="Image 7">
+            <a:extLst>
+              <a:ext uri="{FF2B5EF4-FFF2-40B4-BE49-F238E27FC236}">
+                <a16:creationId xmlns:a16="http://schemas.microsoft.com/office/drawing/2014/main" id="{07E0E3D4-DECB-BE46-BD0B-880D1C96C07C}"/>
+              </a:ext>
+            </a:extLst>
+          </p:cNvPr>
+          <p:cNvPicPr>
+            <a:picLocks noChangeAspect="1"/>
+          </p:cNvPicPr>
+          <p:nvPr/>
+        </p:nvPicPr>
+        <p:blipFill>
+          <a:blip r:embed="rId4">
+            <a:extLst>
+              <a:ext uri="{28A0092B-C50C-407E-A947-70E740481C1C}">
+                <a14:useLocalDpi xmlns:a14="http://schemas.microsoft.com/office/drawing/2010/main" val="0"/>
+              </a:ext>
+            </a:extLst>
+          </a:blip>
+          <a:stretch>
+            <a:fillRect/>
+          </a:stretch>
+        </p:blipFill>
+        <p:spPr>
+          <a:xfrm>
+            <a:off x="2517742" y="3978912"/>
+            <a:ext cx="2560000" cy="2560000"/>
+          </a:xfrm>
+          <a:prstGeom prst="rect">
+            <a:avLst/>
+          </a:prstGeom>
+        </p:spPr>
+      </p:pic>
+      <p:pic>
+        <p:nvPicPr>
+          <p:cNvPr id="10" name="Image 9">
+            <a:extLst>
+              <a:ext uri="{FF2B5EF4-FFF2-40B4-BE49-F238E27FC236}">
+                <a16:creationId xmlns:a16="http://schemas.microsoft.com/office/drawing/2014/main" id="{D388B51D-E3F3-D272-BFF2-74451FDDB337}"/>
+              </a:ext>
+            </a:extLst>
+          </p:cNvPr>
+          <p:cNvPicPr>
+            <a:picLocks noChangeAspect="1"/>
+          </p:cNvPicPr>
+          <p:nvPr/>
+        </p:nvPicPr>
+        <p:blipFill>
+          <a:blip r:embed="rId5">
+            <a:extLst>
+              <a:ext uri="{28A0092B-C50C-407E-A947-70E740481C1C}">
+                <a14:useLocalDpi xmlns:a14="http://schemas.microsoft.com/office/drawing/2010/main" val="0"/>
+              </a:ext>
+            </a:extLst>
+          </a:blip>
+          <a:stretch>
+            <a:fillRect/>
+          </a:stretch>
+        </p:blipFill>
+        <p:spPr>
+          <a:xfrm>
+            <a:off x="5259126" y="1836751"/>
+            <a:ext cx="3295816" cy="3295816"/>
+          </a:xfrm>
+          <a:prstGeom prst="rect">
+            <a:avLst/>
+          </a:prstGeom>
+        </p:spPr>
+      </p:pic>
+      <p:pic>
+        <p:nvPicPr>
+          <p:cNvPr id="12" name="Image 11">
+            <a:extLst>
+              <a:ext uri="{FF2B5EF4-FFF2-40B4-BE49-F238E27FC236}">
+                <a16:creationId xmlns:a16="http://schemas.microsoft.com/office/drawing/2014/main" id="{1EDF6B51-2334-6DC7-FBFE-0FCB6352079F}"/>
+              </a:ext>
+            </a:extLst>
+          </p:cNvPr>
+          <p:cNvPicPr>
+            <a:picLocks noChangeAspect="1"/>
+          </p:cNvPicPr>
+          <p:nvPr/>
+        </p:nvPicPr>
+        <p:blipFill>
+          <a:blip r:embed="rId6">
+            <a:extLst>
+              <a:ext uri="{28A0092B-C50C-407E-A947-70E740481C1C}">
+                <a14:useLocalDpi xmlns:a14="http://schemas.microsoft.com/office/drawing/2010/main" val="0"/>
+              </a:ext>
+            </a:extLst>
+          </a:blip>
+          <a:stretch>
+            <a:fillRect/>
+          </a:stretch>
+        </p:blipFill>
+        <p:spPr>
+          <a:xfrm>
+            <a:off x="8729206" y="2123661"/>
+            <a:ext cx="3295816" cy="3295816"/>
+          </a:xfrm>
+          <a:prstGeom prst="rect">
+            <a:avLst/>
+          </a:prstGeom>
+        </p:spPr>
+      </p:pic>
     </p:spTree>
     <p:extLst>
       <p:ext uri="{BB962C8B-B14F-4D97-AF65-F5344CB8AC3E}">
@@ -6817,6 +7111,35 @@
           <a:prstGeom prst="rect">
             <a:avLst/>
           </a:prstGeom>
+        </p:spPr>
+      </p:pic>
+      <p:pic>
+        <p:nvPicPr>
+          <p:cNvPr id="5" name="Image 4">
+            <a:extLst>
+              <a:ext uri="{FF2B5EF4-FFF2-40B4-BE49-F238E27FC236}">
+                <a16:creationId xmlns:a16="http://schemas.microsoft.com/office/drawing/2014/main" id="{D97F091E-9377-B40A-1A5F-4B52E38481C2}"/>
+              </a:ext>
+            </a:extLst>
+          </p:cNvPr>
+          <p:cNvPicPr/>
+          <p:nvPr/>
+        </p:nvPicPr>
+        <p:blipFill>
+          <a:blip r:embed="rId3"/>
+          <a:stretch/>
+        </p:blipFill>
+        <p:spPr>
+          <a:xfrm>
+            <a:off x="10717408" y="-1"/>
+            <a:ext cx="1620000" cy="1620000"/>
+          </a:xfrm>
+          <a:prstGeom prst="rect">
+            <a:avLst/>
+          </a:prstGeom>
+          <a:ln w="0">
+            <a:noFill/>
+          </a:ln>
         </p:spPr>
       </p:pic>
     </p:spTree>
@@ -7288,7 +7611,7 @@
           <p:cNvPr id="2" name="Titre 1">
             <a:extLst>
               <a:ext uri="{FF2B5EF4-FFF2-40B4-BE49-F238E27FC236}">
-                <a16:creationId xmlns:a16="http://schemas.microsoft.com/office/drawing/2014/main" id="{E722C00A-98D5-4C88-91F9-222539B418A4}"/>
+                <a16:creationId xmlns:a16="http://schemas.microsoft.com/office/drawing/2014/main" id="{62F04D26-E410-232E-5A84-C05C6185DEF0}"/>
               </a:ext>
             </a:extLst>
           </p:cNvPr>
@@ -7306,25 +7629,25 @@
           <a:p>
             <a:r>
               <a:rPr lang="fr-FR" dirty="0"/>
-              <a:t>Organisation du travail</a:t>
-            </a:r>
-          </a:p>
-        </p:txBody>
-      </p:sp>
-      <p:sp>
-        <p:nvSpPr>
-          <p:cNvPr id="3" name="Espace réservé du contenu 2">
-            <a:extLst>
-              <a:ext uri="{FF2B5EF4-FFF2-40B4-BE49-F238E27FC236}">
-                <a16:creationId xmlns:a16="http://schemas.microsoft.com/office/drawing/2014/main" id="{F6755BF7-70F3-49DC-9202-57A832480E1F}"/>
-              </a:ext>
-            </a:extLst>
-          </p:cNvPr>
-          <p:cNvSpPr>
-            <a:spLocks noGrp="1"/>
-          </p:cNvSpPr>
-          <p:nvPr>
-            <p:ph idx="1"/>
+              <a:t>Choix de l’API</a:t>
+            </a:r>
+          </a:p>
+        </p:txBody>
+      </p:sp>
+      <p:sp>
+        <p:nvSpPr>
+          <p:cNvPr id="4" name="Espace réservé du numéro de diapositive 3">
+            <a:extLst>
+              <a:ext uri="{FF2B5EF4-FFF2-40B4-BE49-F238E27FC236}">
+                <a16:creationId xmlns:a16="http://schemas.microsoft.com/office/drawing/2014/main" id="{08ADEFD9-6C77-C5B4-B78C-96613882B418}"/>
+              </a:ext>
+            </a:extLst>
+          </p:cNvPr>
+          <p:cNvSpPr>
+            <a:spLocks noGrp="1"/>
+          </p:cNvSpPr>
+          <p:nvPr>
+            <p:ph type="sldNum" sz="quarter" idx="12"/>
           </p:nvPr>
         </p:nvSpPr>
         <p:spPr/>
@@ -7332,16 +7655,92 @@
           <a:bodyPr/>
           <a:lstStyle/>
           <a:p>
-            <a:endParaRPr lang="fr-FR"/>
+            <a:fld id="{07CE569E-9B7C-4CB9-AB80-C0841F922CFF}" type="slidenum">
+              <a:rPr lang="en-US" smtClean="0"/>
+              <a:t>7</a:t>
+            </a:fld>
+            <a:endParaRPr lang="en-US"/>
           </a:p>
         </p:txBody>
       </p:sp>
       <p:pic>
         <p:nvPicPr>
-          <p:cNvPr id="4" name="Image 3">
-            <a:extLst>
-              <a:ext uri="{FF2B5EF4-FFF2-40B4-BE49-F238E27FC236}">
-                <a16:creationId xmlns:a16="http://schemas.microsoft.com/office/drawing/2014/main" id="{F785CEE5-051F-48D8-AF42-641071039C13}"/>
+          <p:cNvPr id="5" name="Image 4">
+            <a:extLst>
+              <a:ext uri="{FF2B5EF4-FFF2-40B4-BE49-F238E27FC236}">
+                <a16:creationId xmlns:a16="http://schemas.microsoft.com/office/drawing/2014/main" id="{70E100C0-1C8C-02F9-62E2-5D3C29397ECC}"/>
+              </a:ext>
+            </a:extLst>
+          </p:cNvPr>
+          <p:cNvPicPr>
+            <a:picLocks noChangeAspect="1"/>
+          </p:cNvPicPr>
+          <p:nvPr/>
+        </p:nvPicPr>
+        <p:blipFill>
+          <a:blip r:embed="rId2">
+            <a:extLst>
+              <a:ext uri="{28A0092B-C50C-407E-A947-70E740481C1C}">
+                <a14:useLocalDpi xmlns:a14="http://schemas.microsoft.com/office/drawing/2010/main" val="0"/>
+              </a:ext>
+            </a:extLst>
+          </a:blip>
+          <a:stretch>
+            <a:fillRect/>
+          </a:stretch>
+        </p:blipFill>
+        <p:spPr>
+          <a:xfrm>
+            <a:off x="1196009" y="2286000"/>
+            <a:ext cx="3295816" cy="3295816"/>
+          </a:xfrm>
+          <a:prstGeom prst="rect">
+            <a:avLst/>
+          </a:prstGeom>
+        </p:spPr>
+      </p:pic>
+      <p:pic>
+        <p:nvPicPr>
+          <p:cNvPr id="7" name="Image 6" descr="Une image contenant texte&#10;&#10;Description générée automatiquement">
+            <a:extLst>
+              <a:ext uri="{FF2B5EF4-FFF2-40B4-BE49-F238E27FC236}">
+                <a16:creationId xmlns:a16="http://schemas.microsoft.com/office/drawing/2014/main" id="{2D6A9064-D46E-A94F-743C-C51A4E72241B}"/>
+              </a:ext>
+            </a:extLst>
+          </p:cNvPr>
+          <p:cNvPicPr>
+            <a:picLocks noChangeAspect="1"/>
+          </p:cNvPicPr>
+          <p:nvPr/>
+        </p:nvPicPr>
+        <p:blipFill>
+          <a:blip r:embed="rId3">
+            <a:extLst>
+              <a:ext uri="{28A0092B-C50C-407E-A947-70E740481C1C}">
+                <a14:useLocalDpi xmlns:a14="http://schemas.microsoft.com/office/drawing/2010/main" val="0"/>
+              </a:ext>
+            </a:extLst>
+          </a:blip>
+          <a:stretch>
+            <a:fillRect/>
+          </a:stretch>
+        </p:blipFill>
+        <p:spPr>
+          <a:xfrm>
+            <a:off x="5026682" y="3222623"/>
+            <a:ext cx="6915633" cy="1143001"/>
+          </a:xfrm>
+          <a:prstGeom prst="rect">
+            <a:avLst/>
+          </a:prstGeom>
+        </p:spPr>
+      </p:pic>
+      <p:pic>
+        <p:nvPicPr>
+          <p:cNvPr id="8" name="Image 7">
+            <a:extLst>
+              <a:ext uri="{FF2B5EF4-FFF2-40B4-BE49-F238E27FC236}">
+                <a16:creationId xmlns:a16="http://schemas.microsoft.com/office/drawing/2014/main" id="{C30F8DEE-5C94-1412-1C44-7ECF68E2FBE6}"/>
               </a:ext>
             </a:extLst>
           </p:cNvPr>
@@ -7349,7 +7748,7 @@
           <p:nvPr/>
         </p:nvPicPr>
         <p:blipFill>
-          <a:blip r:embed="rId2"/>
+          <a:blip r:embed="rId4"/>
           <a:stretch/>
         </p:blipFill>
         <p:spPr>
@@ -7365,39 +7764,10 @@
           </a:ln>
         </p:spPr>
       </p:pic>
-      <p:sp>
-        <p:nvSpPr>
-          <p:cNvPr id="5" name="Espace réservé du numéro de diapositive 4">
-            <a:extLst>
-              <a:ext uri="{FF2B5EF4-FFF2-40B4-BE49-F238E27FC236}">
-                <a16:creationId xmlns:a16="http://schemas.microsoft.com/office/drawing/2014/main" id="{1864F325-B3BC-455F-894E-4A9C7639A68E}"/>
-              </a:ext>
-            </a:extLst>
-          </p:cNvPr>
-          <p:cNvSpPr>
-            <a:spLocks noGrp="1"/>
-          </p:cNvSpPr>
-          <p:nvPr>
-            <p:ph type="sldNum" sz="quarter" idx="12"/>
-          </p:nvPr>
-        </p:nvSpPr>
-        <p:spPr/>
-        <p:txBody>
-          <a:bodyPr/>
-          <a:lstStyle/>
-          <a:p>
-            <a:fld id="{07CE569E-9B7C-4CB9-AB80-C0841F922CFF}" type="slidenum">
-              <a:rPr lang="en-US" smtClean="0"/>
-              <a:t>7</a:t>
-            </a:fld>
-            <a:endParaRPr lang="en-US"/>
-          </a:p>
-        </p:txBody>
-      </p:sp>
     </p:spTree>
     <p:extLst>
       <p:ext uri="{BB962C8B-B14F-4D97-AF65-F5344CB8AC3E}">
-        <p14:creationId xmlns:p14="http://schemas.microsoft.com/office/powerpoint/2010/main" val="2619827031"/>
+        <p14:creationId xmlns:p14="http://schemas.microsoft.com/office/powerpoint/2010/main" val="3529105821"/>
       </p:ext>
     </p:extLst>
   </p:cSld>
@@ -7429,7 +7799,7 @@
           <p:cNvPr id="2" name="Titre 1">
             <a:extLst>
               <a:ext uri="{FF2B5EF4-FFF2-40B4-BE49-F238E27FC236}">
-                <a16:creationId xmlns:a16="http://schemas.microsoft.com/office/drawing/2014/main" id="{01C70C1F-83B2-4527-9839-D57D3E2860D1}"/>
+                <a16:creationId xmlns:a16="http://schemas.microsoft.com/office/drawing/2014/main" id="{E722C00A-98D5-4C88-91F9-222539B418A4}"/>
               </a:ext>
             </a:extLst>
           </p:cNvPr>
@@ -7447,33 +7817,8 @@
           <a:p>
             <a:r>
               <a:rPr lang="fr-FR" dirty="0"/>
-              <a:t>Points Positifs</a:t>
-            </a:r>
-          </a:p>
-        </p:txBody>
-      </p:sp>
-      <p:sp>
-        <p:nvSpPr>
-          <p:cNvPr id="3" name="Espace réservé du contenu 2">
-            <a:extLst>
-              <a:ext uri="{FF2B5EF4-FFF2-40B4-BE49-F238E27FC236}">
-                <a16:creationId xmlns:a16="http://schemas.microsoft.com/office/drawing/2014/main" id="{45F4A62F-2A84-4282-8196-79A9B88275D4}"/>
-              </a:ext>
-            </a:extLst>
-          </p:cNvPr>
-          <p:cNvSpPr>
-            <a:spLocks noGrp="1"/>
-          </p:cNvSpPr>
-          <p:nvPr>
-            <p:ph idx="1"/>
-          </p:nvPr>
-        </p:nvSpPr>
-        <p:spPr/>
-        <p:txBody>
-          <a:bodyPr/>
-          <a:lstStyle/>
-          <a:p>
-            <a:endParaRPr lang="fr-FR"/>
+              <a:t>Conception de la base de données</a:t>
+            </a:r>
           </a:p>
         </p:txBody>
       </p:sp>
@@ -7482,7 +7827,7 @@
           <p:cNvPr id="4" name="Image 3">
             <a:extLst>
               <a:ext uri="{FF2B5EF4-FFF2-40B4-BE49-F238E27FC236}">
-                <a16:creationId xmlns:a16="http://schemas.microsoft.com/office/drawing/2014/main" id="{7EB913F3-B0D9-4140-AF85-29BDBCF59DA5}"/>
+                <a16:creationId xmlns:a16="http://schemas.microsoft.com/office/drawing/2014/main" id="{F785CEE5-051F-48D8-AF42-641071039C13}"/>
               </a:ext>
             </a:extLst>
           </p:cNvPr>
@@ -7511,7 +7856,7 @@
           <p:cNvPr id="5" name="Espace réservé du numéro de diapositive 4">
             <a:extLst>
               <a:ext uri="{FF2B5EF4-FFF2-40B4-BE49-F238E27FC236}">
-                <a16:creationId xmlns:a16="http://schemas.microsoft.com/office/drawing/2014/main" id="{D8315C57-9FFC-490B-AD6F-88ED7D5828B0}"/>
+                <a16:creationId xmlns:a16="http://schemas.microsoft.com/office/drawing/2014/main" id="{1864F325-B3BC-455F-894E-4A9C7639A68E}"/>
               </a:ext>
             </a:extLst>
           </p:cNvPr>
@@ -7535,10 +7880,213 @@
           </a:p>
         </p:txBody>
       </p:sp>
+      <p:pic>
+        <p:nvPicPr>
+          <p:cNvPr id="6" name="Image 5" descr="SQLite - Wikipedia">
+            <a:extLst>
+              <a:ext uri="{FF2B5EF4-FFF2-40B4-BE49-F238E27FC236}">
+                <a16:creationId xmlns:a16="http://schemas.microsoft.com/office/drawing/2014/main" id="{50E78156-5682-0394-03AF-3FDC8E088FBE}"/>
+              </a:ext>
+            </a:extLst>
+          </p:cNvPr>
+          <p:cNvPicPr>
+            <a:picLocks noChangeAspect="1"/>
+          </p:cNvPicPr>
+          <p:nvPr/>
+        </p:nvPicPr>
+        <p:blipFill>
+          <a:blip r:embed="rId3">
+            <a:extLst>
+              <a:ext uri="{28A0092B-C50C-407E-A947-70E740481C1C}">
+                <a14:useLocalDpi xmlns:a14="http://schemas.microsoft.com/office/drawing/2010/main" val="0"/>
+              </a:ext>
+            </a:extLst>
+          </a:blip>
+          <a:srcRect/>
+          <a:stretch>
+            <a:fillRect/>
+          </a:stretch>
+        </p:blipFill>
+        <p:spPr bwMode="auto">
+          <a:xfrm>
+            <a:off x="1202110" y="2907512"/>
+            <a:ext cx="4206736" cy="1995024"/>
+          </a:xfrm>
+          <a:prstGeom prst="rect">
+            <a:avLst/>
+          </a:prstGeom>
+          <a:noFill/>
+          <a:ln>
+            <a:noFill/>
+          </a:ln>
+        </p:spPr>
+      </p:pic>
+      <p:sp>
+        <p:nvSpPr>
+          <p:cNvPr id="7" name="ZoneTexte 6">
+            <a:extLst>
+              <a:ext uri="{FF2B5EF4-FFF2-40B4-BE49-F238E27FC236}">
+                <a16:creationId xmlns:a16="http://schemas.microsoft.com/office/drawing/2014/main" id="{1B2CB618-8C1D-14AD-DFDB-D7376D11058E}"/>
+              </a:ext>
+            </a:extLst>
+          </p:cNvPr>
+          <p:cNvSpPr txBox="1"/>
+          <p:nvPr/>
+        </p:nvSpPr>
+        <p:spPr>
+          <a:xfrm>
+            <a:off x="6639083" y="2540057"/>
+            <a:ext cx="1632155" cy="1477328"/>
+          </a:xfrm>
+          <a:prstGeom prst="rect">
+            <a:avLst/>
+          </a:prstGeom>
+          <a:noFill/>
+          <a:ln w="28575">
+            <a:solidFill>
+              <a:schemeClr val="bg1"/>
+            </a:solidFill>
+          </a:ln>
+        </p:spPr>
+        <p:txBody>
+          <a:bodyPr wrap="square" rtlCol="0">
+            <a:spAutoFit/>
+          </a:bodyPr>
+          <a:lstStyle/>
+          <a:p>
+            <a:r>
+              <a:rPr lang="fr-FR" dirty="0"/>
+              <a:t>User</a:t>
+            </a:r>
+          </a:p>
+          <a:p>
+            <a:r>
+              <a:rPr lang="fr-FR" dirty="0"/>
+              <a:t>-------------------</a:t>
+            </a:r>
+          </a:p>
+          <a:p>
+            <a:r>
+              <a:rPr lang="fr-FR" dirty="0"/>
+              <a:t>Id </a:t>
+            </a:r>
+          </a:p>
+          <a:p>
+            <a:r>
+              <a:rPr lang="fr-FR" dirty="0"/>
+              <a:t>Name</a:t>
+            </a:r>
+          </a:p>
+          <a:p>
+            <a:r>
+              <a:rPr lang="fr-FR" dirty="0" err="1"/>
+              <a:t>Password</a:t>
+            </a:r>
+            <a:endParaRPr lang="fr-FR" dirty="0"/>
+          </a:p>
+        </p:txBody>
+      </p:sp>
+      <p:sp>
+        <p:nvSpPr>
+          <p:cNvPr id="8" name="ZoneTexte 7">
+            <a:extLst>
+              <a:ext uri="{FF2B5EF4-FFF2-40B4-BE49-F238E27FC236}">
+                <a16:creationId xmlns:a16="http://schemas.microsoft.com/office/drawing/2014/main" id="{9BD77D6E-E446-8375-778E-93FBE49F363F}"/>
+              </a:ext>
+            </a:extLst>
+          </p:cNvPr>
+          <p:cNvSpPr txBox="1"/>
+          <p:nvPr/>
+        </p:nvSpPr>
+        <p:spPr>
+          <a:xfrm>
+            <a:off x="9424866" y="2817056"/>
+            <a:ext cx="1632155" cy="923330"/>
+          </a:xfrm>
+          <a:prstGeom prst="rect">
+            <a:avLst/>
+          </a:prstGeom>
+          <a:noFill/>
+          <a:ln w="28575">
+            <a:solidFill>
+              <a:schemeClr val="bg1"/>
+            </a:solidFill>
+          </a:ln>
+        </p:spPr>
+        <p:txBody>
+          <a:bodyPr wrap="square" rtlCol="0">
+            <a:spAutoFit/>
+          </a:bodyPr>
+          <a:lstStyle/>
+          <a:p>
+            <a:r>
+              <a:rPr lang="fr-FR" dirty="0"/>
+              <a:t>Favoris</a:t>
+            </a:r>
+          </a:p>
+          <a:p>
+            <a:r>
+              <a:rPr lang="fr-FR" dirty="0"/>
+              <a:t>-------------------</a:t>
+            </a:r>
+          </a:p>
+          <a:p>
+            <a:r>
+              <a:rPr lang="fr-FR" dirty="0"/>
+              <a:t>Id</a:t>
+            </a:r>
+          </a:p>
+        </p:txBody>
+      </p:sp>
+      <p:cxnSp>
+        <p:nvCxnSpPr>
+          <p:cNvPr id="10" name="Connecteur droit avec flèche 9">
+            <a:extLst>
+              <a:ext uri="{FF2B5EF4-FFF2-40B4-BE49-F238E27FC236}">
+                <a16:creationId xmlns:a16="http://schemas.microsoft.com/office/drawing/2014/main" id="{751B0AA0-68B6-E945-C3E5-461118DBC449}"/>
+              </a:ext>
+            </a:extLst>
+          </p:cNvPr>
+          <p:cNvCxnSpPr>
+            <a:stCxn id="7" idx="3"/>
+            <a:endCxn id="8" idx="1"/>
+          </p:cNvCxnSpPr>
+          <p:nvPr/>
+        </p:nvCxnSpPr>
+        <p:spPr>
+          <a:xfrm>
+            <a:off x="8271238" y="3278721"/>
+            <a:ext cx="1153628" cy="0"/>
+          </a:xfrm>
+          <a:prstGeom prst="straightConnector1">
+            <a:avLst/>
+          </a:prstGeom>
+          <a:ln w="28575">
+            <a:solidFill>
+              <a:schemeClr val="accent6"/>
+            </a:solidFill>
+            <a:tailEnd type="triangle"/>
+          </a:ln>
+        </p:spPr>
+        <p:style>
+          <a:lnRef idx="1">
+            <a:schemeClr val="accent1"/>
+          </a:lnRef>
+          <a:fillRef idx="0">
+            <a:schemeClr val="accent1"/>
+          </a:fillRef>
+          <a:effectRef idx="0">
+            <a:schemeClr val="accent1"/>
+          </a:effectRef>
+          <a:fontRef idx="minor">
+            <a:schemeClr val="tx1"/>
+          </a:fontRef>
+        </p:style>
+      </p:cxnSp>
     </p:spTree>
     <p:extLst>
       <p:ext uri="{BB962C8B-B14F-4D97-AF65-F5344CB8AC3E}">
-        <p14:creationId xmlns:p14="http://schemas.microsoft.com/office/powerpoint/2010/main" val="2440258800"/>
+        <p14:creationId xmlns:p14="http://schemas.microsoft.com/office/powerpoint/2010/main" val="2619827031"/>
       </p:ext>
     </p:extLst>
   </p:cSld>
@@ -7570,7 +8118,7 @@
           <p:cNvPr id="2" name="Titre 1">
             <a:extLst>
               <a:ext uri="{FF2B5EF4-FFF2-40B4-BE49-F238E27FC236}">
-                <a16:creationId xmlns:a16="http://schemas.microsoft.com/office/drawing/2014/main" id="{9015EA5D-F7D8-4592-9528-661EA62F3201}"/>
+                <a16:creationId xmlns:a16="http://schemas.microsoft.com/office/drawing/2014/main" id="{01C70C1F-83B2-4527-9839-D57D3E2860D1}"/>
               </a:ext>
             </a:extLst>
           </p:cNvPr>
@@ -7588,7 +8136,7 @@
           <a:p>
             <a:r>
               <a:rPr lang="fr-FR" dirty="0"/>
-              <a:t>Difficultés rencontrés</a:t>
+              <a:t>Points Positifs</a:t>
             </a:r>
           </a:p>
         </p:txBody>
@@ -7598,7 +8146,7 @@
           <p:cNvPr id="3" name="Espace réservé du contenu 2">
             <a:extLst>
               <a:ext uri="{FF2B5EF4-FFF2-40B4-BE49-F238E27FC236}">
-                <a16:creationId xmlns:a16="http://schemas.microsoft.com/office/drawing/2014/main" id="{3604A20E-7854-44D4-B4C0-1565346C2673}"/>
+                <a16:creationId xmlns:a16="http://schemas.microsoft.com/office/drawing/2014/main" id="{45F4A62F-2A84-4282-8196-79A9B88275D4}"/>
               </a:ext>
             </a:extLst>
           </p:cNvPr>
@@ -7614,7 +8162,22 @@
           <a:bodyPr/>
           <a:lstStyle/>
           <a:p>
-            <a:endParaRPr lang="fr-FR"/>
+            <a:r>
+              <a:rPr lang="fr-FR" dirty="0"/>
+              <a:t>API Facile à utilisé </a:t>
+            </a:r>
+          </a:p>
+          <a:p>
+            <a:r>
+              <a:rPr lang="fr-FR" dirty="0"/>
+              <a:t>Application libre</a:t>
+            </a:r>
+          </a:p>
+          <a:p>
+            <a:r>
+              <a:rPr lang="fr-FR" dirty="0"/>
+              <a:t>Approfondissement des compétences</a:t>
+            </a:r>
           </a:p>
         </p:txBody>
       </p:sp>
@@ -7623,7 +8186,7 @@
           <p:cNvPr id="4" name="Image 3">
             <a:extLst>
               <a:ext uri="{FF2B5EF4-FFF2-40B4-BE49-F238E27FC236}">
-                <a16:creationId xmlns:a16="http://schemas.microsoft.com/office/drawing/2014/main" id="{4F8A4A1E-10D1-4885-90FF-0EB2C6FF9618}"/>
+                <a16:creationId xmlns:a16="http://schemas.microsoft.com/office/drawing/2014/main" id="{7EB913F3-B0D9-4140-AF85-29BDBCF59DA5}"/>
               </a:ext>
             </a:extLst>
           </p:cNvPr>
@@ -7652,7 +8215,7 @@
           <p:cNvPr id="5" name="Espace réservé du numéro de diapositive 4">
             <a:extLst>
               <a:ext uri="{FF2B5EF4-FFF2-40B4-BE49-F238E27FC236}">
-                <a16:creationId xmlns:a16="http://schemas.microsoft.com/office/drawing/2014/main" id="{961771C7-9CE0-477F-9677-5AB8A5CD8191}"/>
+                <a16:creationId xmlns:a16="http://schemas.microsoft.com/office/drawing/2014/main" id="{D8315C57-9FFC-490B-AD6F-88ED7D5828B0}"/>
               </a:ext>
             </a:extLst>
           </p:cNvPr>
@@ -7679,7 +8242,7 @@
     </p:spTree>
     <p:extLst>
       <p:ext uri="{BB962C8B-B14F-4D97-AF65-F5344CB8AC3E}">
-        <p14:creationId xmlns:p14="http://schemas.microsoft.com/office/powerpoint/2010/main" val="1646511795"/>
+        <p14:creationId xmlns:p14="http://schemas.microsoft.com/office/powerpoint/2010/main" val="2440258800"/>
       </p:ext>
     </p:extLst>
   </p:cSld>

</xml_diff>